<commit_message>
Undo Diagram 1: Rename AddressBook -> TaskManager
</commit_message>
<xml_diff>
--- a/docs/diagrams/UndoRedoNewCommand1StateListDiagram.pptx
+++ b/docs/diagrams/UndoRedoNewCommand1StateListDiagram.pptx
@@ -138,7 +138,7 @@
           <p:cNvPr id="2" name="Title 1">
             <a:extLst>
               <a:ext uri="{FF2B5EF4-FFF2-40B4-BE49-F238E27FC236}">
-                <a16:creationId xmlns:a16="http://schemas.microsoft.com/office/drawing/2014/main" id="{39FCC519-EE2E-4054-A653-93D611E0133E}"/>
+                <a16:creationId xmlns:a16="http://schemas.microsoft.com/office/drawing/2014/main" xmlns="" id="{39FCC519-EE2E-4054-A653-93D611E0133E}"/>
               </a:ext>
             </a:extLst>
           </p:cNvPr>
@@ -176,7 +176,7 @@
           <p:cNvPr id="3" name="Subtitle 2">
             <a:extLst>
               <a:ext uri="{FF2B5EF4-FFF2-40B4-BE49-F238E27FC236}">
-                <a16:creationId xmlns:a16="http://schemas.microsoft.com/office/drawing/2014/main" id="{3EDEA74E-4030-4F69-A055-4C6319EEEC29}"/>
+                <a16:creationId xmlns:a16="http://schemas.microsoft.com/office/drawing/2014/main" xmlns="" id="{3EDEA74E-4030-4F69-A055-4C6319EEEC29}"/>
               </a:ext>
             </a:extLst>
           </p:cNvPr>
@@ -247,7 +247,7 @@
           <p:cNvPr id="4" name="Date Placeholder 3">
             <a:extLst>
               <a:ext uri="{FF2B5EF4-FFF2-40B4-BE49-F238E27FC236}">
-                <a16:creationId xmlns:a16="http://schemas.microsoft.com/office/drawing/2014/main" id="{E5CC99E3-37A6-4485-B9A2-AF27A72608C6}"/>
+                <a16:creationId xmlns:a16="http://schemas.microsoft.com/office/drawing/2014/main" xmlns="" id="{E5CC99E3-37A6-4485-B9A2-AF27A72608C6}"/>
               </a:ext>
             </a:extLst>
           </p:cNvPr>
@@ -265,7 +265,7 @@
           <a:p>
             <a:fld id="{03EC4E3E-8101-482F-A883-8B55DAFF7C07}" type="datetimeFigureOut">
               <a:rPr lang="en-SG" smtClean="0"/>
-              <a:t>6/7/2018</a:t>
+              <a:t>18/10/18</a:t>
             </a:fld>
             <a:endParaRPr lang="en-SG"/>
           </a:p>
@@ -276,7 +276,7 @@
           <p:cNvPr id="5" name="Footer Placeholder 4">
             <a:extLst>
               <a:ext uri="{FF2B5EF4-FFF2-40B4-BE49-F238E27FC236}">
-                <a16:creationId xmlns:a16="http://schemas.microsoft.com/office/drawing/2014/main" id="{D75BD546-D949-4A25-8EA4-47DF23229409}"/>
+                <a16:creationId xmlns:a16="http://schemas.microsoft.com/office/drawing/2014/main" xmlns="" id="{D75BD546-D949-4A25-8EA4-47DF23229409}"/>
               </a:ext>
             </a:extLst>
           </p:cNvPr>
@@ -301,7 +301,7 @@
           <p:cNvPr id="6" name="Slide Number Placeholder 5">
             <a:extLst>
               <a:ext uri="{FF2B5EF4-FFF2-40B4-BE49-F238E27FC236}">
-                <a16:creationId xmlns:a16="http://schemas.microsoft.com/office/drawing/2014/main" id="{68147391-4DF6-4ACF-BCE9-C1A9DAC803E3}"/>
+                <a16:creationId xmlns:a16="http://schemas.microsoft.com/office/drawing/2014/main" xmlns="" id="{68147391-4DF6-4ACF-BCE9-C1A9DAC803E3}"/>
               </a:ext>
             </a:extLst>
           </p:cNvPr>
@@ -360,7 +360,7 @@
           <p:cNvPr id="2" name="Title 1">
             <a:extLst>
               <a:ext uri="{FF2B5EF4-FFF2-40B4-BE49-F238E27FC236}">
-                <a16:creationId xmlns:a16="http://schemas.microsoft.com/office/drawing/2014/main" id="{251D3DFE-0C62-45F5-B1BF-FD1F194ED112}"/>
+                <a16:creationId xmlns:a16="http://schemas.microsoft.com/office/drawing/2014/main" xmlns="" id="{251D3DFE-0C62-45F5-B1BF-FD1F194ED112}"/>
               </a:ext>
             </a:extLst>
           </p:cNvPr>
@@ -389,7 +389,7 @@
           <p:cNvPr id="3" name="Vertical Text Placeholder 2">
             <a:extLst>
               <a:ext uri="{FF2B5EF4-FFF2-40B4-BE49-F238E27FC236}">
-                <a16:creationId xmlns:a16="http://schemas.microsoft.com/office/drawing/2014/main" id="{D2392762-3586-4B6D-A174-2D3ACF0A125B}"/>
+                <a16:creationId xmlns:a16="http://schemas.microsoft.com/office/drawing/2014/main" xmlns="" id="{D2392762-3586-4B6D-A174-2D3ACF0A125B}"/>
               </a:ext>
             </a:extLst>
           </p:cNvPr>
@@ -447,7 +447,7 @@
           <p:cNvPr id="4" name="Date Placeholder 3">
             <a:extLst>
               <a:ext uri="{FF2B5EF4-FFF2-40B4-BE49-F238E27FC236}">
-                <a16:creationId xmlns:a16="http://schemas.microsoft.com/office/drawing/2014/main" id="{73B232E7-84FB-4535-9FC1-1BEF8F17421F}"/>
+                <a16:creationId xmlns:a16="http://schemas.microsoft.com/office/drawing/2014/main" xmlns="" id="{73B232E7-84FB-4535-9FC1-1BEF8F17421F}"/>
               </a:ext>
             </a:extLst>
           </p:cNvPr>
@@ -465,7 +465,7 @@
           <a:p>
             <a:fld id="{03EC4E3E-8101-482F-A883-8B55DAFF7C07}" type="datetimeFigureOut">
               <a:rPr lang="en-SG" smtClean="0"/>
-              <a:t>6/7/2018</a:t>
+              <a:t>18/10/18</a:t>
             </a:fld>
             <a:endParaRPr lang="en-SG"/>
           </a:p>
@@ -476,7 +476,7 @@
           <p:cNvPr id="5" name="Footer Placeholder 4">
             <a:extLst>
               <a:ext uri="{FF2B5EF4-FFF2-40B4-BE49-F238E27FC236}">
-                <a16:creationId xmlns:a16="http://schemas.microsoft.com/office/drawing/2014/main" id="{76F796EF-04EF-401A-AC84-F7BDBC99DE80}"/>
+                <a16:creationId xmlns:a16="http://schemas.microsoft.com/office/drawing/2014/main" xmlns="" id="{76F796EF-04EF-401A-AC84-F7BDBC99DE80}"/>
               </a:ext>
             </a:extLst>
           </p:cNvPr>
@@ -501,7 +501,7 @@
           <p:cNvPr id="6" name="Slide Number Placeholder 5">
             <a:extLst>
               <a:ext uri="{FF2B5EF4-FFF2-40B4-BE49-F238E27FC236}">
-                <a16:creationId xmlns:a16="http://schemas.microsoft.com/office/drawing/2014/main" id="{8F55F009-0A64-4649-A732-4AA6D619F1F3}"/>
+                <a16:creationId xmlns:a16="http://schemas.microsoft.com/office/drawing/2014/main" xmlns="" id="{8F55F009-0A64-4649-A732-4AA6D619F1F3}"/>
               </a:ext>
             </a:extLst>
           </p:cNvPr>
@@ -560,7 +560,7 @@
           <p:cNvPr id="2" name="Vertical Title 1">
             <a:extLst>
               <a:ext uri="{FF2B5EF4-FFF2-40B4-BE49-F238E27FC236}">
-                <a16:creationId xmlns:a16="http://schemas.microsoft.com/office/drawing/2014/main" id="{F7DE9595-D7A8-4E19-B4C6-E295F978F6A4}"/>
+                <a16:creationId xmlns:a16="http://schemas.microsoft.com/office/drawing/2014/main" xmlns="" id="{F7DE9595-D7A8-4E19-B4C6-E295F978F6A4}"/>
               </a:ext>
             </a:extLst>
           </p:cNvPr>
@@ -594,7 +594,7 @@
           <p:cNvPr id="3" name="Vertical Text Placeholder 2">
             <a:extLst>
               <a:ext uri="{FF2B5EF4-FFF2-40B4-BE49-F238E27FC236}">
-                <a16:creationId xmlns:a16="http://schemas.microsoft.com/office/drawing/2014/main" id="{0D2975B7-7A6D-40EA-B2F6-338022AD2BF1}"/>
+                <a16:creationId xmlns:a16="http://schemas.microsoft.com/office/drawing/2014/main" xmlns="" id="{0D2975B7-7A6D-40EA-B2F6-338022AD2BF1}"/>
               </a:ext>
             </a:extLst>
           </p:cNvPr>
@@ -657,7 +657,7 @@
           <p:cNvPr id="4" name="Date Placeholder 3">
             <a:extLst>
               <a:ext uri="{FF2B5EF4-FFF2-40B4-BE49-F238E27FC236}">
-                <a16:creationId xmlns:a16="http://schemas.microsoft.com/office/drawing/2014/main" id="{C8230AC3-1BED-4D2B-96D3-51C50E14A9E6}"/>
+                <a16:creationId xmlns:a16="http://schemas.microsoft.com/office/drawing/2014/main" xmlns="" id="{C8230AC3-1BED-4D2B-96D3-51C50E14A9E6}"/>
               </a:ext>
             </a:extLst>
           </p:cNvPr>
@@ -675,7 +675,7 @@
           <a:p>
             <a:fld id="{03EC4E3E-8101-482F-A883-8B55DAFF7C07}" type="datetimeFigureOut">
               <a:rPr lang="en-SG" smtClean="0"/>
-              <a:t>6/7/2018</a:t>
+              <a:t>18/10/18</a:t>
             </a:fld>
             <a:endParaRPr lang="en-SG"/>
           </a:p>
@@ -686,7 +686,7 @@
           <p:cNvPr id="5" name="Footer Placeholder 4">
             <a:extLst>
               <a:ext uri="{FF2B5EF4-FFF2-40B4-BE49-F238E27FC236}">
-                <a16:creationId xmlns:a16="http://schemas.microsoft.com/office/drawing/2014/main" id="{4AD6CA96-231A-43AD-B530-7C509651DE3B}"/>
+                <a16:creationId xmlns:a16="http://schemas.microsoft.com/office/drawing/2014/main" xmlns="" id="{4AD6CA96-231A-43AD-B530-7C509651DE3B}"/>
               </a:ext>
             </a:extLst>
           </p:cNvPr>
@@ -711,7 +711,7 @@
           <p:cNvPr id="6" name="Slide Number Placeholder 5">
             <a:extLst>
               <a:ext uri="{FF2B5EF4-FFF2-40B4-BE49-F238E27FC236}">
-                <a16:creationId xmlns:a16="http://schemas.microsoft.com/office/drawing/2014/main" id="{12063E3B-180A-454E-A661-6CCD48D7062C}"/>
+                <a16:creationId xmlns:a16="http://schemas.microsoft.com/office/drawing/2014/main" xmlns="" id="{12063E3B-180A-454E-A661-6CCD48D7062C}"/>
               </a:ext>
             </a:extLst>
           </p:cNvPr>
@@ -770,7 +770,7 @@
           <p:cNvPr id="2" name="Title 1">
             <a:extLst>
               <a:ext uri="{FF2B5EF4-FFF2-40B4-BE49-F238E27FC236}">
-                <a16:creationId xmlns:a16="http://schemas.microsoft.com/office/drawing/2014/main" id="{7E861C8D-BAF0-4DD9-92B9-591B272791CA}"/>
+                <a16:creationId xmlns:a16="http://schemas.microsoft.com/office/drawing/2014/main" xmlns="" id="{7E861C8D-BAF0-4DD9-92B9-591B272791CA}"/>
               </a:ext>
             </a:extLst>
           </p:cNvPr>
@@ -799,7 +799,7 @@
           <p:cNvPr id="3" name="Content Placeholder 2">
             <a:extLst>
               <a:ext uri="{FF2B5EF4-FFF2-40B4-BE49-F238E27FC236}">
-                <a16:creationId xmlns:a16="http://schemas.microsoft.com/office/drawing/2014/main" id="{534DA4BD-1D78-446B-B79F-C1229642DDEB}"/>
+                <a16:creationId xmlns:a16="http://schemas.microsoft.com/office/drawing/2014/main" xmlns="" id="{534DA4BD-1D78-446B-B79F-C1229642DDEB}"/>
               </a:ext>
             </a:extLst>
           </p:cNvPr>
@@ -857,7 +857,7 @@
           <p:cNvPr id="4" name="Date Placeholder 3">
             <a:extLst>
               <a:ext uri="{FF2B5EF4-FFF2-40B4-BE49-F238E27FC236}">
-                <a16:creationId xmlns:a16="http://schemas.microsoft.com/office/drawing/2014/main" id="{AD6BEDB5-7B62-4953-BECB-7F7F3E909CAC}"/>
+                <a16:creationId xmlns:a16="http://schemas.microsoft.com/office/drawing/2014/main" xmlns="" id="{AD6BEDB5-7B62-4953-BECB-7F7F3E909CAC}"/>
               </a:ext>
             </a:extLst>
           </p:cNvPr>
@@ -875,7 +875,7 @@
           <a:p>
             <a:fld id="{03EC4E3E-8101-482F-A883-8B55DAFF7C07}" type="datetimeFigureOut">
               <a:rPr lang="en-SG" smtClean="0"/>
-              <a:t>6/7/2018</a:t>
+              <a:t>18/10/18</a:t>
             </a:fld>
             <a:endParaRPr lang="en-SG"/>
           </a:p>
@@ -886,7 +886,7 @@
           <p:cNvPr id="5" name="Footer Placeholder 4">
             <a:extLst>
               <a:ext uri="{FF2B5EF4-FFF2-40B4-BE49-F238E27FC236}">
-                <a16:creationId xmlns:a16="http://schemas.microsoft.com/office/drawing/2014/main" id="{349CD732-2DD1-42BE-8480-5C6507018294}"/>
+                <a16:creationId xmlns:a16="http://schemas.microsoft.com/office/drawing/2014/main" xmlns="" id="{349CD732-2DD1-42BE-8480-5C6507018294}"/>
               </a:ext>
             </a:extLst>
           </p:cNvPr>
@@ -911,7 +911,7 @@
           <p:cNvPr id="6" name="Slide Number Placeholder 5">
             <a:extLst>
               <a:ext uri="{FF2B5EF4-FFF2-40B4-BE49-F238E27FC236}">
-                <a16:creationId xmlns:a16="http://schemas.microsoft.com/office/drawing/2014/main" id="{574C27E0-F36A-4438-9402-C2CB0377D92D}"/>
+                <a16:creationId xmlns:a16="http://schemas.microsoft.com/office/drawing/2014/main" xmlns="" id="{574C27E0-F36A-4438-9402-C2CB0377D92D}"/>
               </a:ext>
             </a:extLst>
           </p:cNvPr>
@@ -970,7 +970,7 @@
           <p:cNvPr id="2" name="Title 1">
             <a:extLst>
               <a:ext uri="{FF2B5EF4-FFF2-40B4-BE49-F238E27FC236}">
-                <a16:creationId xmlns:a16="http://schemas.microsoft.com/office/drawing/2014/main" id="{80A42FFA-8A45-40F8-9C5C-9906971B38AB}"/>
+                <a16:creationId xmlns:a16="http://schemas.microsoft.com/office/drawing/2014/main" xmlns="" id="{80A42FFA-8A45-40F8-9C5C-9906971B38AB}"/>
               </a:ext>
             </a:extLst>
           </p:cNvPr>
@@ -1008,7 +1008,7 @@
           <p:cNvPr id="3" name="Text Placeholder 2">
             <a:extLst>
               <a:ext uri="{FF2B5EF4-FFF2-40B4-BE49-F238E27FC236}">
-                <a16:creationId xmlns:a16="http://schemas.microsoft.com/office/drawing/2014/main" id="{7D8879A7-8225-4473-B738-B780B6224EC5}"/>
+                <a16:creationId xmlns:a16="http://schemas.microsoft.com/office/drawing/2014/main" xmlns="" id="{7D8879A7-8225-4473-B738-B780B6224EC5}"/>
               </a:ext>
             </a:extLst>
           </p:cNvPr>
@@ -1133,7 +1133,7 @@
           <p:cNvPr id="4" name="Date Placeholder 3">
             <a:extLst>
               <a:ext uri="{FF2B5EF4-FFF2-40B4-BE49-F238E27FC236}">
-                <a16:creationId xmlns:a16="http://schemas.microsoft.com/office/drawing/2014/main" id="{6CF7978C-FE65-4091-9152-E33029C12AEA}"/>
+                <a16:creationId xmlns:a16="http://schemas.microsoft.com/office/drawing/2014/main" xmlns="" id="{6CF7978C-FE65-4091-9152-E33029C12AEA}"/>
               </a:ext>
             </a:extLst>
           </p:cNvPr>
@@ -1151,7 +1151,7 @@
           <a:p>
             <a:fld id="{03EC4E3E-8101-482F-A883-8B55DAFF7C07}" type="datetimeFigureOut">
               <a:rPr lang="en-SG" smtClean="0"/>
-              <a:t>6/7/2018</a:t>
+              <a:t>18/10/18</a:t>
             </a:fld>
             <a:endParaRPr lang="en-SG"/>
           </a:p>
@@ -1162,7 +1162,7 @@
           <p:cNvPr id="5" name="Footer Placeholder 4">
             <a:extLst>
               <a:ext uri="{FF2B5EF4-FFF2-40B4-BE49-F238E27FC236}">
-                <a16:creationId xmlns:a16="http://schemas.microsoft.com/office/drawing/2014/main" id="{B344C9CC-480F-4DCB-AC70-D7A4CCA0B8B7}"/>
+                <a16:creationId xmlns:a16="http://schemas.microsoft.com/office/drawing/2014/main" xmlns="" id="{B344C9CC-480F-4DCB-AC70-D7A4CCA0B8B7}"/>
               </a:ext>
             </a:extLst>
           </p:cNvPr>
@@ -1187,7 +1187,7 @@
           <p:cNvPr id="6" name="Slide Number Placeholder 5">
             <a:extLst>
               <a:ext uri="{FF2B5EF4-FFF2-40B4-BE49-F238E27FC236}">
-                <a16:creationId xmlns:a16="http://schemas.microsoft.com/office/drawing/2014/main" id="{8F5A07EC-843A-4ED9-8F1C-AD703CA36D58}"/>
+                <a16:creationId xmlns:a16="http://schemas.microsoft.com/office/drawing/2014/main" xmlns="" id="{8F5A07EC-843A-4ED9-8F1C-AD703CA36D58}"/>
               </a:ext>
             </a:extLst>
           </p:cNvPr>
@@ -1246,7 +1246,7 @@
           <p:cNvPr id="2" name="Title 1">
             <a:extLst>
               <a:ext uri="{FF2B5EF4-FFF2-40B4-BE49-F238E27FC236}">
-                <a16:creationId xmlns:a16="http://schemas.microsoft.com/office/drawing/2014/main" id="{056EE2DA-07D9-4774-A8CA-0CA247F8C72A}"/>
+                <a16:creationId xmlns:a16="http://schemas.microsoft.com/office/drawing/2014/main" xmlns="" id="{056EE2DA-07D9-4774-A8CA-0CA247F8C72A}"/>
               </a:ext>
             </a:extLst>
           </p:cNvPr>
@@ -1275,7 +1275,7 @@
           <p:cNvPr id="3" name="Content Placeholder 2">
             <a:extLst>
               <a:ext uri="{FF2B5EF4-FFF2-40B4-BE49-F238E27FC236}">
-                <a16:creationId xmlns:a16="http://schemas.microsoft.com/office/drawing/2014/main" id="{3CF93A59-4E25-4FFA-8796-AA06EF3E5C3E}"/>
+                <a16:creationId xmlns:a16="http://schemas.microsoft.com/office/drawing/2014/main" xmlns="" id="{3CF93A59-4E25-4FFA-8796-AA06EF3E5C3E}"/>
               </a:ext>
             </a:extLst>
           </p:cNvPr>
@@ -1338,7 +1338,7 @@
           <p:cNvPr id="4" name="Content Placeholder 3">
             <a:extLst>
               <a:ext uri="{FF2B5EF4-FFF2-40B4-BE49-F238E27FC236}">
-                <a16:creationId xmlns:a16="http://schemas.microsoft.com/office/drawing/2014/main" id="{81373B10-E346-4893-AFEE-65E014405E2D}"/>
+                <a16:creationId xmlns:a16="http://schemas.microsoft.com/office/drawing/2014/main" xmlns="" id="{81373B10-E346-4893-AFEE-65E014405E2D}"/>
               </a:ext>
             </a:extLst>
           </p:cNvPr>
@@ -1401,7 +1401,7 @@
           <p:cNvPr id="5" name="Date Placeholder 4">
             <a:extLst>
               <a:ext uri="{FF2B5EF4-FFF2-40B4-BE49-F238E27FC236}">
-                <a16:creationId xmlns:a16="http://schemas.microsoft.com/office/drawing/2014/main" id="{D9C411A1-6D64-4C63-A758-5D2FEE677F45}"/>
+                <a16:creationId xmlns:a16="http://schemas.microsoft.com/office/drawing/2014/main" xmlns="" id="{D9C411A1-6D64-4C63-A758-5D2FEE677F45}"/>
               </a:ext>
             </a:extLst>
           </p:cNvPr>
@@ -1419,7 +1419,7 @@
           <a:p>
             <a:fld id="{03EC4E3E-8101-482F-A883-8B55DAFF7C07}" type="datetimeFigureOut">
               <a:rPr lang="en-SG" smtClean="0"/>
-              <a:t>6/7/2018</a:t>
+              <a:t>18/10/18</a:t>
             </a:fld>
             <a:endParaRPr lang="en-SG"/>
           </a:p>
@@ -1430,7 +1430,7 @@
           <p:cNvPr id="6" name="Footer Placeholder 5">
             <a:extLst>
               <a:ext uri="{FF2B5EF4-FFF2-40B4-BE49-F238E27FC236}">
-                <a16:creationId xmlns:a16="http://schemas.microsoft.com/office/drawing/2014/main" id="{8D9C2E46-644C-4155-A697-764A7A0AB1F4}"/>
+                <a16:creationId xmlns:a16="http://schemas.microsoft.com/office/drawing/2014/main" xmlns="" id="{8D9C2E46-644C-4155-A697-764A7A0AB1F4}"/>
               </a:ext>
             </a:extLst>
           </p:cNvPr>
@@ -1455,7 +1455,7 @@
           <p:cNvPr id="7" name="Slide Number Placeholder 6">
             <a:extLst>
               <a:ext uri="{FF2B5EF4-FFF2-40B4-BE49-F238E27FC236}">
-                <a16:creationId xmlns:a16="http://schemas.microsoft.com/office/drawing/2014/main" id="{6192DEDD-6479-45E4-B1F5-6EDD41BBB103}"/>
+                <a16:creationId xmlns:a16="http://schemas.microsoft.com/office/drawing/2014/main" xmlns="" id="{6192DEDD-6479-45E4-B1F5-6EDD41BBB103}"/>
               </a:ext>
             </a:extLst>
           </p:cNvPr>
@@ -1514,7 +1514,7 @@
           <p:cNvPr id="2" name="Title 1">
             <a:extLst>
               <a:ext uri="{FF2B5EF4-FFF2-40B4-BE49-F238E27FC236}">
-                <a16:creationId xmlns:a16="http://schemas.microsoft.com/office/drawing/2014/main" id="{DC0ED888-63EF-4CC0-8500-9C8DB672FEC2}"/>
+                <a16:creationId xmlns:a16="http://schemas.microsoft.com/office/drawing/2014/main" xmlns="" id="{DC0ED888-63EF-4CC0-8500-9C8DB672FEC2}"/>
               </a:ext>
             </a:extLst>
           </p:cNvPr>
@@ -1548,7 +1548,7 @@
           <p:cNvPr id="3" name="Text Placeholder 2">
             <a:extLst>
               <a:ext uri="{FF2B5EF4-FFF2-40B4-BE49-F238E27FC236}">
-                <a16:creationId xmlns:a16="http://schemas.microsoft.com/office/drawing/2014/main" id="{3C33BC1E-FB79-4906-A967-9C7046C6D272}"/>
+                <a16:creationId xmlns:a16="http://schemas.microsoft.com/office/drawing/2014/main" xmlns="" id="{3C33BC1E-FB79-4906-A967-9C7046C6D272}"/>
               </a:ext>
             </a:extLst>
           </p:cNvPr>
@@ -1619,7 +1619,7 @@
           <p:cNvPr id="4" name="Content Placeholder 3">
             <a:extLst>
               <a:ext uri="{FF2B5EF4-FFF2-40B4-BE49-F238E27FC236}">
-                <a16:creationId xmlns:a16="http://schemas.microsoft.com/office/drawing/2014/main" id="{697A4EC6-1C42-4BA4-8108-32579276C17B}"/>
+                <a16:creationId xmlns:a16="http://schemas.microsoft.com/office/drawing/2014/main" xmlns="" id="{697A4EC6-1C42-4BA4-8108-32579276C17B}"/>
               </a:ext>
             </a:extLst>
           </p:cNvPr>
@@ -1682,7 +1682,7 @@
           <p:cNvPr id="5" name="Text Placeholder 4">
             <a:extLst>
               <a:ext uri="{FF2B5EF4-FFF2-40B4-BE49-F238E27FC236}">
-                <a16:creationId xmlns:a16="http://schemas.microsoft.com/office/drawing/2014/main" id="{8A2CA209-B9F5-4E1E-B302-74CC2D4CFDFB}"/>
+                <a16:creationId xmlns:a16="http://schemas.microsoft.com/office/drawing/2014/main" xmlns="" id="{8A2CA209-B9F5-4E1E-B302-74CC2D4CFDFB}"/>
               </a:ext>
             </a:extLst>
           </p:cNvPr>
@@ -1753,7 +1753,7 @@
           <p:cNvPr id="6" name="Content Placeholder 5">
             <a:extLst>
               <a:ext uri="{FF2B5EF4-FFF2-40B4-BE49-F238E27FC236}">
-                <a16:creationId xmlns:a16="http://schemas.microsoft.com/office/drawing/2014/main" id="{0E6E876D-DC4D-40EE-BA38-CD01089602CF}"/>
+                <a16:creationId xmlns:a16="http://schemas.microsoft.com/office/drawing/2014/main" xmlns="" id="{0E6E876D-DC4D-40EE-BA38-CD01089602CF}"/>
               </a:ext>
             </a:extLst>
           </p:cNvPr>
@@ -1816,7 +1816,7 @@
           <p:cNvPr id="7" name="Date Placeholder 6">
             <a:extLst>
               <a:ext uri="{FF2B5EF4-FFF2-40B4-BE49-F238E27FC236}">
-                <a16:creationId xmlns:a16="http://schemas.microsoft.com/office/drawing/2014/main" id="{F24E1D97-8B3C-41A1-B0BA-BA833AD8BC7C}"/>
+                <a16:creationId xmlns:a16="http://schemas.microsoft.com/office/drawing/2014/main" xmlns="" id="{F24E1D97-8B3C-41A1-B0BA-BA833AD8BC7C}"/>
               </a:ext>
             </a:extLst>
           </p:cNvPr>
@@ -1834,7 +1834,7 @@
           <a:p>
             <a:fld id="{03EC4E3E-8101-482F-A883-8B55DAFF7C07}" type="datetimeFigureOut">
               <a:rPr lang="en-SG" smtClean="0"/>
-              <a:t>6/7/2018</a:t>
+              <a:t>18/10/18</a:t>
             </a:fld>
             <a:endParaRPr lang="en-SG"/>
           </a:p>
@@ -1845,7 +1845,7 @@
           <p:cNvPr id="8" name="Footer Placeholder 7">
             <a:extLst>
               <a:ext uri="{FF2B5EF4-FFF2-40B4-BE49-F238E27FC236}">
-                <a16:creationId xmlns:a16="http://schemas.microsoft.com/office/drawing/2014/main" id="{FC358D8F-B7DA-4DCE-AC8F-706450EEC0DC}"/>
+                <a16:creationId xmlns:a16="http://schemas.microsoft.com/office/drawing/2014/main" xmlns="" id="{FC358D8F-B7DA-4DCE-AC8F-706450EEC0DC}"/>
               </a:ext>
             </a:extLst>
           </p:cNvPr>
@@ -1870,7 +1870,7 @@
           <p:cNvPr id="9" name="Slide Number Placeholder 8">
             <a:extLst>
               <a:ext uri="{FF2B5EF4-FFF2-40B4-BE49-F238E27FC236}">
-                <a16:creationId xmlns:a16="http://schemas.microsoft.com/office/drawing/2014/main" id="{40CE354E-2C73-4B6F-8AEB-14D1378A77E1}"/>
+                <a16:creationId xmlns:a16="http://schemas.microsoft.com/office/drawing/2014/main" xmlns="" id="{40CE354E-2C73-4B6F-8AEB-14D1378A77E1}"/>
               </a:ext>
             </a:extLst>
           </p:cNvPr>
@@ -1929,7 +1929,7 @@
           <p:cNvPr id="2" name="Title 1">
             <a:extLst>
               <a:ext uri="{FF2B5EF4-FFF2-40B4-BE49-F238E27FC236}">
-                <a16:creationId xmlns:a16="http://schemas.microsoft.com/office/drawing/2014/main" id="{17D9D381-288C-43FB-86C2-AAA4FCFD43FD}"/>
+                <a16:creationId xmlns:a16="http://schemas.microsoft.com/office/drawing/2014/main" xmlns="" id="{17D9D381-288C-43FB-86C2-AAA4FCFD43FD}"/>
               </a:ext>
             </a:extLst>
           </p:cNvPr>
@@ -1958,7 +1958,7 @@
           <p:cNvPr id="3" name="Date Placeholder 2">
             <a:extLst>
               <a:ext uri="{FF2B5EF4-FFF2-40B4-BE49-F238E27FC236}">
-                <a16:creationId xmlns:a16="http://schemas.microsoft.com/office/drawing/2014/main" id="{A85D75E5-4830-4F75-8132-91122609F925}"/>
+                <a16:creationId xmlns:a16="http://schemas.microsoft.com/office/drawing/2014/main" xmlns="" id="{A85D75E5-4830-4F75-8132-91122609F925}"/>
               </a:ext>
             </a:extLst>
           </p:cNvPr>
@@ -1976,7 +1976,7 @@
           <a:p>
             <a:fld id="{03EC4E3E-8101-482F-A883-8B55DAFF7C07}" type="datetimeFigureOut">
               <a:rPr lang="en-SG" smtClean="0"/>
-              <a:t>6/7/2018</a:t>
+              <a:t>18/10/18</a:t>
             </a:fld>
             <a:endParaRPr lang="en-SG"/>
           </a:p>
@@ -1987,7 +1987,7 @@
           <p:cNvPr id="4" name="Footer Placeholder 3">
             <a:extLst>
               <a:ext uri="{FF2B5EF4-FFF2-40B4-BE49-F238E27FC236}">
-                <a16:creationId xmlns:a16="http://schemas.microsoft.com/office/drawing/2014/main" id="{0C14A42C-834F-43EA-8053-84D5A665CEE7}"/>
+                <a16:creationId xmlns:a16="http://schemas.microsoft.com/office/drawing/2014/main" xmlns="" id="{0C14A42C-834F-43EA-8053-84D5A665CEE7}"/>
               </a:ext>
             </a:extLst>
           </p:cNvPr>
@@ -2012,7 +2012,7 @@
           <p:cNvPr id="5" name="Slide Number Placeholder 4">
             <a:extLst>
               <a:ext uri="{FF2B5EF4-FFF2-40B4-BE49-F238E27FC236}">
-                <a16:creationId xmlns:a16="http://schemas.microsoft.com/office/drawing/2014/main" id="{38C1E789-CDA9-48FF-A7BA-F21E31600226}"/>
+                <a16:creationId xmlns:a16="http://schemas.microsoft.com/office/drawing/2014/main" xmlns="" id="{38C1E789-CDA9-48FF-A7BA-F21E31600226}"/>
               </a:ext>
             </a:extLst>
           </p:cNvPr>
@@ -2071,7 +2071,7 @@
           <p:cNvPr id="2" name="Date Placeholder 1">
             <a:extLst>
               <a:ext uri="{FF2B5EF4-FFF2-40B4-BE49-F238E27FC236}">
-                <a16:creationId xmlns:a16="http://schemas.microsoft.com/office/drawing/2014/main" id="{21A40ECD-0ABD-4F35-B481-512A01FC643D}"/>
+                <a16:creationId xmlns:a16="http://schemas.microsoft.com/office/drawing/2014/main" xmlns="" id="{21A40ECD-0ABD-4F35-B481-512A01FC643D}"/>
               </a:ext>
             </a:extLst>
           </p:cNvPr>
@@ -2089,7 +2089,7 @@
           <a:p>
             <a:fld id="{03EC4E3E-8101-482F-A883-8B55DAFF7C07}" type="datetimeFigureOut">
               <a:rPr lang="en-SG" smtClean="0"/>
-              <a:t>6/7/2018</a:t>
+              <a:t>18/10/18</a:t>
             </a:fld>
             <a:endParaRPr lang="en-SG"/>
           </a:p>
@@ -2100,7 +2100,7 @@
           <p:cNvPr id="3" name="Footer Placeholder 2">
             <a:extLst>
               <a:ext uri="{FF2B5EF4-FFF2-40B4-BE49-F238E27FC236}">
-                <a16:creationId xmlns:a16="http://schemas.microsoft.com/office/drawing/2014/main" id="{D44B8F11-A412-4FA6-9070-B9C742F699F3}"/>
+                <a16:creationId xmlns:a16="http://schemas.microsoft.com/office/drawing/2014/main" xmlns="" id="{D44B8F11-A412-4FA6-9070-B9C742F699F3}"/>
               </a:ext>
             </a:extLst>
           </p:cNvPr>
@@ -2125,7 +2125,7 @@
           <p:cNvPr id="4" name="Slide Number Placeholder 3">
             <a:extLst>
               <a:ext uri="{FF2B5EF4-FFF2-40B4-BE49-F238E27FC236}">
-                <a16:creationId xmlns:a16="http://schemas.microsoft.com/office/drawing/2014/main" id="{E3EA086A-DA0B-4378-A128-F213644ECB0C}"/>
+                <a16:creationId xmlns:a16="http://schemas.microsoft.com/office/drawing/2014/main" xmlns="" id="{E3EA086A-DA0B-4378-A128-F213644ECB0C}"/>
               </a:ext>
             </a:extLst>
           </p:cNvPr>
@@ -2184,7 +2184,7 @@
           <p:cNvPr id="2" name="Title 1">
             <a:extLst>
               <a:ext uri="{FF2B5EF4-FFF2-40B4-BE49-F238E27FC236}">
-                <a16:creationId xmlns:a16="http://schemas.microsoft.com/office/drawing/2014/main" id="{765D165A-D423-4E89-A075-D59A9FB59792}"/>
+                <a16:creationId xmlns:a16="http://schemas.microsoft.com/office/drawing/2014/main" xmlns="" id="{765D165A-D423-4E89-A075-D59A9FB59792}"/>
               </a:ext>
             </a:extLst>
           </p:cNvPr>
@@ -2222,7 +2222,7 @@
           <p:cNvPr id="3" name="Content Placeholder 2">
             <a:extLst>
               <a:ext uri="{FF2B5EF4-FFF2-40B4-BE49-F238E27FC236}">
-                <a16:creationId xmlns:a16="http://schemas.microsoft.com/office/drawing/2014/main" id="{77C2A5CC-2876-49CA-993D-F4F73FC9D2B0}"/>
+                <a16:creationId xmlns:a16="http://schemas.microsoft.com/office/drawing/2014/main" xmlns="" id="{77C2A5CC-2876-49CA-993D-F4F73FC9D2B0}"/>
               </a:ext>
             </a:extLst>
           </p:cNvPr>
@@ -2313,7 +2313,7 @@
           <p:cNvPr id="4" name="Text Placeholder 3">
             <a:extLst>
               <a:ext uri="{FF2B5EF4-FFF2-40B4-BE49-F238E27FC236}">
-                <a16:creationId xmlns:a16="http://schemas.microsoft.com/office/drawing/2014/main" id="{7B4DE2E8-CCF6-4E88-A858-05A04CD0D736}"/>
+                <a16:creationId xmlns:a16="http://schemas.microsoft.com/office/drawing/2014/main" xmlns="" id="{7B4DE2E8-CCF6-4E88-A858-05A04CD0D736}"/>
               </a:ext>
             </a:extLst>
           </p:cNvPr>
@@ -2384,7 +2384,7 @@
           <p:cNvPr id="5" name="Date Placeholder 4">
             <a:extLst>
               <a:ext uri="{FF2B5EF4-FFF2-40B4-BE49-F238E27FC236}">
-                <a16:creationId xmlns:a16="http://schemas.microsoft.com/office/drawing/2014/main" id="{CAEBEC1E-DE48-4B55-A846-F8248E381145}"/>
+                <a16:creationId xmlns:a16="http://schemas.microsoft.com/office/drawing/2014/main" xmlns="" id="{CAEBEC1E-DE48-4B55-A846-F8248E381145}"/>
               </a:ext>
             </a:extLst>
           </p:cNvPr>
@@ -2402,7 +2402,7 @@
           <a:p>
             <a:fld id="{03EC4E3E-8101-482F-A883-8B55DAFF7C07}" type="datetimeFigureOut">
               <a:rPr lang="en-SG" smtClean="0"/>
-              <a:t>6/7/2018</a:t>
+              <a:t>18/10/18</a:t>
             </a:fld>
             <a:endParaRPr lang="en-SG"/>
           </a:p>
@@ -2413,7 +2413,7 @@
           <p:cNvPr id="6" name="Footer Placeholder 5">
             <a:extLst>
               <a:ext uri="{FF2B5EF4-FFF2-40B4-BE49-F238E27FC236}">
-                <a16:creationId xmlns:a16="http://schemas.microsoft.com/office/drawing/2014/main" id="{945A6E8B-6BC2-49E9-B4E5-DAD3F7A1A1BF}"/>
+                <a16:creationId xmlns:a16="http://schemas.microsoft.com/office/drawing/2014/main" xmlns="" id="{945A6E8B-6BC2-49E9-B4E5-DAD3F7A1A1BF}"/>
               </a:ext>
             </a:extLst>
           </p:cNvPr>
@@ -2438,7 +2438,7 @@
           <p:cNvPr id="7" name="Slide Number Placeholder 6">
             <a:extLst>
               <a:ext uri="{FF2B5EF4-FFF2-40B4-BE49-F238E27FC236}">
-                <a16:creationId xmlns:a16="http://schemas.microsoft.com/office/drawing/2014/main" id="{E5CF739B-EDF0-43CE-A87E-C49F040C85A5}"/>
+                <a16:creationId xmlns:a16="http://schemas.microsoft.com/office/drawing/2014/main" xmlns="" id="{E5CF739B-EDF0-43CE-A87E-C49F040C85A5}"/>
               </a:ext>
             </a:extLst>
           </p:cNvPr>
@@ -2497,7 +2497,7 @@
           <p:cNvPr id="2" name="Title 1">
             <a:extLst>
               <a:ext uri="{FF2B5EF4-FFF2-40B4-BE49-F238E27FC236}">
-                <a16:creationId xmlns:a16="http://schemas.microsoft.com/office/drawing/2014/main" id="{0091F49F-E849-4834-84DB-61CF2F2652D4}"/>
+                <a16:creationId xmlns:a16="http://schemas.microsoft.com/office/drawing/2014/main" xmlns="" id="{0091F49F-E849-4834-84DB-61CF2F2652D4}"/>
               </a:ext>
             </a:extLst>
           </p:cNvPr>
@@ -2535,7 +2535,7 @@
           <p:cNvPr id="3" name="Picture Placeholder 2">
             <a:extLst>
               <a:ext uri="{FF2B5EF4-FFF2-40B4-BE49-F238E27FC236}">
-                <a16:creationId xmlns:a16="http://schemas.microsoft.com/office/drawing/2014/main" id="{631D62A9-3420-4F1C-9EB9-09EF85106E78}"/>
+                <a16:creationId xmlns:a16="http://schemas.microsoft.com/office/drawing/2014/main" xmlns="" id="{631D62A9-3420-4F1C-9EB9-09EF85106E78}"/>
               </a:ext>
             </a:extLst>
           </p:cNvPr>
@@ -2602,7 +2602,7 @@
           <p:cNvPr id="4" name="Text Placeholder 3">
             <a:extLst>
               <a:ext uri="{FF2B5EF4-FFF2-40B4-BE49-F238E27FC236}">
-                <a16:creationId xmlns:a16="http://schemas.microsoft.com/office/drawing/2014/main" id="{E450EC8D-D7F4-45FC-AD8C-2E198A32CCA2}"/>
+                <a16:creationId xmlns:a16="http://schemas.microsoft.com/office/drawing/2014/main" xmlns="" id="{E450EC8D-D7F4-45FC-AD8C-2E198A32CCA2}"/>
               </a:ext>
             </a:extLst>
           </p:cNvPr>
@@ -2673,7 +2673,7 @@
           <p:cNvPr id="5" name="Date Placeholder 4">
             <a:extLst>
               <a:ext uri="{FF2B5EF4-FFF2-40B4-BE49-F238E27FC236}">
-                <a16:creationId xmlns:a16="http://schemas.microsoft.com/office/drawing/2014/main" id="{7A73D668-ABF4-41FE-958C-542EEDC5F6CC}"/>
+                <a16:creationId xmlns:a16="http://schemas.microsoft.com/office/drawing/2014/main" xmlns="" id="{7A73D668-ABF4-41FE-958C-542EEDC5F6CC}"/>
               </a:ext>
             </a:extLst>
           </p:cNvPr>
@@ -2691,7 +2691,7 @@
           <a:p>
             <a:fld id="{03EC4E3E-8101-482F-A883-8B55DAFF7C07}" type="datetimeFigureOut">
               <a:rPr lang="en-SG" smtClean="0"/>
-              <a:t>6/7/2018</a:t>
+              <a:t>18/10/18</a:t>
             </a:fld>
             <a:endParaRPr lang="en-SG"/>
           </a:p>
@@ -2702,7 +2702,7 @@
           <p:cNvPr id="6" name="Footer Placeholder 5">
             <a:extLst>
               <a:ext uri="{FF2B5EF4-FFF2-40B4-BE49-F238E27FC236}">
-                <a16:creationId xmlns:a16="http://schemas.microsoft.com/office/drawing/2014/main" id="{F4A83B1C-93E7-4D32-9D1B-3F37403B1ACD}"/>
+                <a16:creationId xmlns:a16="http://schemas.microsoft.com/office/drawing/2014/main" xmlns="" id="{F4A83B1C-93E7-4D32-9D1B-3F37403B1ACD}"/>
               </a:ext>
             </a:extLst>
           </p:cNvPr>
@@ -2727,7 +2727,7 @@
           <p:cNvPr id="7" name="Slide Number Placeholder 6">
             <a:extLst>
               <a:ext uri="{FF2B5EF4-FFF2-40B4-BE49-F238E27FC236}">
-                <a16:creationId xmlns:a16="http://schemas.microsoft.com/office/drawing/2014/main" id="{C6AF73BE-F17B-487B-943B-28655BB51C92}"/>
+                <a16:creationId xmlns:a16="http://schemas.microsoft.com/office/drawing/2014/main" xmlns="" id="{C6AF73BE-F17B-487B-943B-28655BB51C92}"/>
               </a:ext>
             </a:extLst>
           </p:cNvPr>
@@ -2791,7 +2791,7 @@
           <p:cNvPr id="2" name="Title Placeholder 1">
             <a:extLst>
               <a:ext uri="{FF2B5EF4-FFF2-40B4-BE49-F238E27FC236}">
-                <a16:creationId xmlns:a16="http://schemas.microsoft.com/office/drawing/2014/main" id="{96F7127E-5F47-4B37-9FDB-695AB14D9551}"/>
+                <a16:creationId xmlns:a16="http://schemas.microsoft.com/office/drawing/2014/main" xmlns="" id="{96F7127E-5F47-4B37-9FDB-695AB14D9551}"/>
               </a:ext>
             </a:extLst>
           </p:cNvPr>
@@ -2830,7 +2830,7 @@
           <p:cNvPr id="3" name="Text Placeholder 2">
             <a:extLst>
               <a:ext uri="{FF2B5EF4-FFF2-40B4-BE49-F238E27FC236}">
-                <a16:creationId xmlns:a16="http://schemas.microsoft.com/office/drawing/2014/main" id="{3BD20F0F-B303-4EE3-AF17-E303EA90B1A3}"/>
+                <a16:creationId xmlns:a16="http://schemas.microsoft.com/office/drawing/2014/main" xmlns="" id="{3BD20F0F-B303-4EE3-AF17-E303EA90B1A3}"/>
               </a:ext>
             </a:extLst>
           </p:cNvPr>
@@ -2898,7 +2898,7 @@
           <p:cNvPr id="4" name="Date Placeholder 3">
             <a:extLst>
               <a:ext uri="{FF2B5EF4-FFF2-40B4-BE49-F238E27FC236}">
-                <a16:creationId xmlns:a16="http://schemas.microsoft.com/office/drawing/2014/main" id="{7927ADFB-0C7F-4333-A456-815FAB4B0315}"/>
+                <a16:creationId xmlns:a16="http://schemas.microsoft.com/office/drawing/2014/main" xmlns="" id="{7927ADFB-0C7F-4333-A456-815FAB4B0315}"/>
               </a:ext>
             </a:extLst>
           </p:cNvPr>
@@ -2934,7 +2934,7 @@
           <a:p>
             <a:fld id="{03EC4E3E-8101-482F-A883-8B55DAFF7C07}" type="datetimeFigureOut">
               <a:rPr lang="en-SG" smtClean="0"/>
-              <a:t>6/7/2018</a:t>
+              <a:t>18/10/18</a:t>
             </a:fld>
             <a:endParaRPr lang="en-SG"/>
           </a:p>
@@ -2945,7 +2945,7 @@
           <p:cNvPr id="5" name="Footer Placeholder 4">
             <a:extLst>
               <a:ext uri="{FF2B5EF4-FFF2-40B4-BE49-F238E27FC236}">
-                <a16:creationId xmlns:a16="http://schemas.microsoft.com/office/drawing/2014/main" id="{A1992B28-8397-4C93-A277-5EE43A537825}"/>
+                <a16:creationId xmlns:a16="http://schemas.microsoft.com/office/drawing/2014/main" xmlns="" id="{A1992B28-8397-4C93-A277-5EE43A537825}"/>
               </a:ext>
             </a:extLst>
           </p:cNvPr>
@@ -2988,7 +2988,7 @@
           <p:cNvPr id="6" name="Slide Number Placeholder 5">
             <a:extLst>
               <a:ext uri="{FF2B5EF4-FFF2-40B4-BE49-F238E27FC236}">
-                <a16:creationId xmlns:a16="http://schemas.microsoft.com/office/drawing/2014/main" id="{D7231209-A74B-4134-87D0-421AB81BBB47}"/>
+                <a16:creationId xmlns:a16="http://schemas.microsoft.com/office/drawing/2014/main" xmlns="" id="{D7231209-A74B-4134-87D0-421AB81BBB47}"/>
               </a:ext>
             </a:extLst>
           </p:cNvPr>
@@ -3356,7 +3356,7 @@
           <p:cNvPr id="45" name="TextBox 44">
             <a:extLst>
               <a:ext uri="{FF2B5EF4-FFF2-40B4-BE49-F238E27FC236}">
-                <a16:creationId xmlns:a16="http://schemas.microsoft.com/office/drawing/2014/main" id="{3151A13B-9509-43FA-BFEB-1D9866A00B84}"/>
+                <a16:creationId xmlns:a16="http://schemas.microsoft.com/office/drawing/2014/main" xmlns="" id="{3151A13B-9509-43FA-BFEB-1D9866A00B84}"/>
               </a:ext>
             </a:extLst>
           </p:cNvPr>
@@ -3400,7 +3400,7 @@
           <p:cNvPr id="13" name="Table 12">
             <a:extLst>
               <a:ext uri="{FF2B5EF4-FFF2-40B4-BE49-F238E27FC236}">
-                <a16:creationId xmlns:a16="http://schemas.microsoft.com/office/drawing/2014/main" id="{F545FAB8-F1CE-4886-9BDE-E772BCB0A9C4}"/>
+                <a16:creationId xmlns:a16="http://schemas.microsoft.com/office/drawing/2014/main" xmlns="" id="{F545FAB8-F1CE-4886-9BDE-E772BCB0A9C4}"/>
               </a:ext>
             </a:extLst>
           </p:cNvPr>
@@ -3410,14 +3410,14 @@
           <p:nvPr>
             <p:extLst>
               <p:ext uri="{D42A27DB-BD31-4B8C-83A1-F6EECF244321}">
-                <p14:modId xmlns:p14="http://schemas.microsoft.com/office/powerpoint/2010/main" val="770650361"/>
+                <p14:modId xmlns:p14="http://schemas.microsoft.com/office/powerpoint/2010/main" val="1951509091"/>
               </p:ext>
             </p:extLst>
           </p:nvPr>
         </p:nvGraphicFramePr>
         <p:xfrm>
           <a:off x="473240" y="1476102"/>
-          <a:ext cx="1833356" cy="410363"/>
+          <a:ext cx="1975028" cy="410363"/>
         </p:xfrm>
         <a:graphic>
           <a:graphicData uri="http://schemas.openxmlformats.org/drawingml/2006/table">
@@ -3426,10 +3426,10 @@
                 <a:tableStyleId>{638B1855-1B75-4FBE-930C-398BA8C253C6}</a:tableStyleId>
               </a:tblPr>
               <a:tblGrid>
-                <a:gridCol w="1833356">
+                <a:gridCol w="1975028">
                   <a:extLst>
                     <a:ext uri="{9D8B030D-6E8A-4147-A177-3AD203B41FA5}">
-                      <a16:colId xmlns:a16="http://schemas.microsoft.com/office/drawing/2014/main" val="4240773277"/>
+                      <a16:colId xmlns:a16="http://schemas.microsoft.com/office/drawing/2014/main" xmlns="" val="4240773277"/>
                     </a:ext>
                   </a:extLst>
                 </a:gridCol>
@@ -3441,21 +3441,45 @@
                     <a:lstStyle/>
                     <a:p>
                       <a:r>
-                        <a:rPr lang="en-SG" u="sng" dirty="0"/>
-                        <a:t>ab0:</a:t>
+                        <a:rPr lang="en-US" sz="1800" u="sng" kern="1200" dirty="0" smtClean="0">
+                          <a:solidFill>
+                            <a:schemeClr val="lt1"/>
+                          </a:solidFill>
+                          <a:effectLst/>
+                          <a:latin typeface="+mn-lt"/>
+                          <a:ea typeface="+mn-ea"/>
+                          <a:cs typeface="+mn-cs"/>
+                        </a:rPr>
+                        <a:t>tm0:TaskManager</a:t>
                       </a:r>
                       <a:r>
-                        <a:rPr lang="en-SG" sz="1800" u="sng" dirty="0"/>
-                        <a:t>AddressBook</a:t>
+                        <a:rPr lang="en-US" sz="1800" kern="1200" dirty="0" smtClean="0">
+                          <a:solidFill>
+                            <a:schemeClr val="lt1"/>
+                          </a:solidFill>
+                          <a:effectLst/>
+                          <a:latin typeface="+mn-lt"/>
+                          <a:ea typeface="+mn-ea"/>
+                          <a:cs typeface="+mn-cs"/>
+                        </a:rPr>
+                        <a:t> </a:t>
                       </a:r>
-                      <a:endParaRPr lang="en-SG" sz="1600" u="sng" dirty="0"/>
+                      <a:endParaRPr lang="en-US" sz="1800" kern="1200" dirty="0">
+                        <a:solidFill>
+                          <a:schemeClr val="lt1"/>
+                        </a:solidFill>
+                        <a:effectLst/>
+                        <a:latin typeface="+mn-lt"/>
+                        <a:ea typeface="+mn-ea"/>
+                        <a:cs typeface="+mn-cs"/>
+                      </a:endParaRPr>
                     </a:p>
                   </a:txBody>
                   <a:tcPr/>
                 </a:tc>
                 <a:extLst>
                   <a:ext uri="{0D108BD9-81ED-4DB2-BD59-A6C34878D82A}">
-                    <a16:rowId xmlns:a16="http://schemas.microsoft.com/office/drawing/2014/main" val="2194462629"/>
+                    <a16:rowId xmlns:a16="http://schemas.microsoft.com/office/drawing/2014/main" xmlns="" val="2194462629"/>
                   </a:ext>
                 </a:extLst>
               </a:tr>
@@ -3558,7 +3582,7 @@
           <p:cNvPr id="19" name="TextBox 18">
             <a:extLst>
               <a:ext uri="{FF2B5EF4-FFF2-40B4-BE49-F238E27FC236}">
-                <a16:creationId xmlns:a16="http://schemas.microsoft.com/office/drawing/2014/main" id="{3151A13B-9509-43FA-BFEB-1D9866A00B84}"/>
+                <a16:creationId xmlns:a16="http://schemas.microsoft.com/office/drawing/2014/main" xmlns="" id="{3151A13B-9509-43FA-BFEB-1D9866A00B84}"/>
               </a:ext>
             </a:extLst>
           </p:cNvPr>
@@ -3648,7 +3672,7 @@
           <p:cNvPr id="12" name="Table 11">
             <a:extLst>
               <a:ext uri="{FF2B5EF4-FFF2-40B4-BE49-F238E27FC236}">
-                <a16:creationId xmlns:a16="http://schemas.microsoft.com/office/drawing/2014/main" id="{F545FAB8-F1CE-4886-9BDE-E772BCB0A9C4}"/>
+                <a16:creationId xmlns:a16="http://schemas.microsoft.com/office/drawing/2014/main" xmlns="" id="{F545FAB8-F1CE-4886-9BDE-E772BCB0A9C4}"/>
               </a:ext>
             </a:extLst>
           </p:cNvPr>
@@ -3658,14 +3682,14 @@
           <p:nvPr>
             <p:extLst>
               <p:ext uri="{D42A27DB-BD31-4B8C-83A1-F6EECF244321}">
-                <p14:modId xmlns:p14="http://schemas.microsoft.com/office/powerpoint/2010/main" val="2370624015"/>
+                <p14:modId xmlns:p14="http://schemas.microsoft.com/office/powerpoint/2010/main" val="387091294"/>
               </p:ext>
             </p:extLst>
           </p:nvPr>
         </p:nvGraphicFramePr>
         <p:xfrm>
-          <a:off x="2448268" y="3926065"/>
-          <a:ext cx="1833356" cy="410363"/>
+          <a:off x="2448267" y="3926065"/>
+          <a:ext cx="1949433" cy="410363"/>
         </p:xfrm>
         <a:graphic>
           <a:graphicData uri="http://schemas.openxmlformats.org/drawingml/2006/table">
@@ -3674,10 +3698,10 @@
                 <a:tableStyleId>{638B1855-1B75-4FBE-930C-398BA8C253C6}</a:tableStyleId>
               </a:tblPr>
               <a:tblGrid>
-                <a:gridCol w="1833356">
+                <a:gridCol w="1949433">
                   <a:extLst>
                     <a:ext uri="{9D8B030D-6E8A-4147-A177-3AD203B41FA5}">
-                      <a16:colId xmlns:a16="http://schemas.microsoft.com/office/drawing/2014/main" val="4240773277"/>
+                      <a16:colId xmlns:a16="http://schemas.microsoft.com/office/drawing/2014/main" xmlns="" val="4240773277"/>
                     </a:ext>
                   </a:extLst>
                 </a:gridCol>
@@ -3689,21 +3713,45 @@
                     <a:lstStyle/>
                     <a:p>
                       <a:r>
-                        <a:rPr lang="en-SG" u="sng" dirty="0"/>
-                        <a:t>ab1:</a:t>
+                        <a:rPr lang="en-US" sz="1800" u="sng" kern="1200" dirty="0" smtClean="0">
+                          <a:solidFill>
+                            <a:schemeClr val="lt1"/>
+                          </a:solidFill>
+                          <a:effectLst/>
+                          <a:latin typeface="+mn-lt"/>
+                          <a:ea typeface="+mn-ea"/>
+                          <a:cs typeface="+mn-cs"/>
+                        </a:rPr>
+                        <a:t>tm1:TaskManager</a:t>
                       </a:r>
                       <a:r>
-                        <a:rPr lang="en-SG" sz="1800" u="sng" dirty="0"/>
-                        <a:t>AddressBook</a:t>
+                        <a:rPr lang="en-US" sz="1800" kern="1200" dirty="0" smtClean="0">
+                          <a:solidFill>
+                            <a:schemeClr val="lt1"/>
+                          </a:solidFill>
+                          <a:effectLst/>
+                          <a:latin typeface="+mn-lt"/>
+                          <a:ea typeface="+mn-ea"/>
+                          <a:cs typeface="+mn-cs"/>
+                        </a:rPr>
+                        <a:t> </a:t>
                       </a:r>
-                      <a:endParaRPr lang="en-SG" sz="1600" u="sng" dirty="0"/>
+                      <a:endParaRPr lang="en-US" sz="1800" kern="1200" dirty="0">
+                        <a:solidFill>
+                          <a:schemeClr val="lt1"/>
+                        </a:solidFill>
+                        <a:effectLst/>
+                        <a:latin typeface="+mn-lt"/>
+                        <a:ea typeface="+mn-ea"/>
+                        <a:cs typeface="+mn-cs"/>
+                      </a:endParaRPr>
                     </a:p>
                   </a:txBody>
                   <a:tcPr/>
                 </a:tc>
                 <a:extLst>
                   <a:ext uri="{0D108BD9-81ED-4DB2-BD59-A6C34878D82A}">
-                    <a16:rowId xmlns:a16="http://schemas.microsoft.com/office/drawing/2014/main" val="2194462629"/>
+                    <a16:rowId xmlns:a16="http://schemas.microsoft.com/office/drawing/2014/main" xmlns="" val="2194462629"/>
                   </a:ext>
                 </a:extLst>
               </a:tr>
@@ -3716,7 +3764,7 @@
           <p:cNvPr id="15" name="Table 14">
             <a:extLst>
               <a:ext uri="{FF2B5EF4-FFF2-40B4-BE49-F238E27FC236}">
-                <a16:creationId xmlns:a16="http://schemas.microsoft.com/office/drawing/2014/main" id="{F545FAB8-F1CE-4886-9BDE-E772BCB0A9C4}"/>
+                <a16:creationId xmlns:a16="http://schemas.microsoft.com/office/drawing/2014/main" xmlns="" id="{F545FAB8-F1CE-4886-9BDE-E772BCB0A9C4}"/>
               </a:ext>
             </a:extLst>
           </p:cNvPr>
@@ -3726,14 +3774,14 @@
           <p:nvPr>
             <p:extLst>
               <p:ext uri="{D42A27DB-BD31-4B8C-83A1-F6EECF244321}">
-                <p14:modId xmlns:p14="http://schemas.microsoft.com/office/powerpoint/2010/main" val="2523374166"/>
+                <p14:modId xmlns:p14="http://schemas.microsoft.com/office/powerpoint/2010/main" val="79372284"/>
               </p:ext>
             </p:extLst>
           </p:nvPr>
         </p:nvGraphicFramePr>
         <p:xfrm>
-          <a:off x="473240" y="3918002"/>
-          <a:ext cx="1833356" cy="410363"/>
+          <a:off x="387404" y="3918002"/>
+          <a:ext cx="1919192" cy="410363"/>
         </p:xfrm>
         <a:graphic>
           <a:graphicData uri="http://schemas.openxmlformats.org/drawingml/2006/table">
@@ -3742,10 +3790,10 @@
                 <a:tableStyleId>{638B1855-1B75-4FBE-930C-398BA8C253C6}</a:tableStyleId>
               </a:tblPr>
               <a:tblGrid>
-                <a:gridCol w="1833356">
+                <a:gridCol w="1919192">
                   <a:extLst>
                     <a:ext uri="{9D8B030D-6E8A-4147-A177-3AD203B41FA5}">
-                      <a16:colId xmlns:a16="http://schemas.microsoft.com/office/drawing/2014/main" val="4240773277"/>
+                      <a16:colId xmlns:a16="http://schemas.microsoft.com/office/drawing/2014/main" xmlns="" val="4240773277"/>
                     </a:ext>
                   </a:extLst>
                 </a:gridCol>
@@ -3757,21 +3805,45 @@
                     <a:lstStyle/>
                     <a:p>
                       <a:r>
-                        <a:rPr lang="en-SG" u="sng" dirty="0"/>
-                        <a:t>ab0:</a:t>
+                        <a:rPr lang="en-US" sz="1800" u="sng" kern="1200" dirty="0" smtClean="0">
+                          <a:solidFill>
+                            <a:schemeClr val="lt1"/>
+                          </a:solidFill>
+                          <a:effectLst/>
+                          <a:latin typeface="+mn-lt"/>
+                          <a:ea typeface="+mn-ea"/>
+                          <a:cs typeface="+mn-cs"/>
+                        </a:rPr>
+                        <a:t>tm0:TaskManager</a:t>
                       </a:r>
                       <a:r>
-                        <a:rPr lang="en-SG" sz="1800" u="sng" dirty="0"/>
-                        <a:t>AddressBook</a:t>
+                        <a:rPr lang="en-US" sz="1800" kern="1200" dirty="0" smtClean="0">
+                          <a:solidFill>
+                            <a:schemeClr val="lt1"/>
+                          </a:solidFill>
+                          <a:effectLst/>
+                          <a:latin typeface="+mn-lt"/>
+                          <a:ea typeface="+mn-ea"/>
+                          <a:cs typeface="+mn-cs"/>
+                        </a:rPr>
+                        <a:t> </a:t>
                       </a:r>
-                      <a:endParaRPr lang="en-SG" sz="1600" u="sng" dirty="0"/>
+                      <a:endParaRPr lang="en-US" sz="1800" kern="1200" dirty="0">
+                        <a:solidFill>
+                          <a:schemeClr val="lt1"/>
+                        </a:solidFill>
+                        <a:effectLst/>
+                        <a:latin typeface="+mn-lt"/>
+                        <a:ea typeface="+mn-ea"/>
+                        <a:cs typeface="+mn-cs"/>
+                      </a:endParaRPr>
                     </a:p>
                   </a:txBody>
                   <a:tcPr/>
                 </a:tc>
                 <a:extLst>
                   <a:ext uri="{0D108BD9-81ED-4DB2-BD59-A6C34878D82A}">
-                    <a16:rowId xmlns:a16="http://schemas.microsoft.com/office/drawing/2014/main" val="2194462629"/>
+                    <a16:rowId xmlns:a16="http://schemas.microsoft.com/office/drawing/2014/main" xmlns="" val="2194462629"/>
                   </a:ext>
                 </a:extLst>
               </a:tr>
@@ -3784,7 +3856,7 @@
           <p:cNvPr id="14" name="Straight Arrow Connector 13">
             <a:extLst>
               <a:ext uri="{FF2B5EF4-FFF2-40B4-BE49-F238E27FC236}">
-                <a16:creationId xmlns:a16="http://schemas.microsoft.com/office/drawing/2014/main" id="{4E562EDA-12B3-44FD-8B44-BCF3C4356EB8}"/>
+                <a16:creationId xmlns:a16="http://schemas.microsoft.com/office/drawing/2014/main" xmlns="" id="{4E562EDA-12B3-44FD-8B44-BCF3C4356EB8}"/>
               </a:ext>
             </a:extLst>
           </p:cNvPr>
@@ -3828,7 +3900,7 @@
           <p:cNvPr id="16" name="Straight Arrow Connector 15">
             <a:extLst>
               <a:ext uri="{FF2B5EF4-FFF2-40B4-BE49-F238E27FC236}">
-                <a16:creationId xmlns:a16="http://schemas.microsoft.com/office/drawing/2014/main" id="{0C07500F-40C6-444B-B521-89577F312910}"/>
+                <a16:creationId xmlns:a16="http://schemas.microsoft.com/office/drawing/2014/main" xmlns="" id="{0C07500F-40C6-444B-B521-89577F312910}"/>
               </a:ext>
             </a:extLst>
           </p:cNvPr>

</xml_diff>

<commit_message>
Update docs/diagrams: - UndoRedoStartingStateListDiagram.pptx - UndoRedoNewCommand1StateListDiagram.pptx - UndoRedoNewCommand2StateListDiagram.pptx - UndoRedoNewCommand3StateListDiagram.pptx - UndoRedoNewCommand4StateListDiagram.pptx
Update docs/images:
- UndoRedoStartingStateListDiagram.png
- UndoRedoNewCommand1StateListDiagram.png
- UndoRedoNewCommand2StateListDiagram.png
- UndoRedoNewCommand3StateListDiagram.png
- UndoRedoNewCommand4StateListDiagram.png
</commit_message>
<xml_diff>
--- a/docs/diagrams/UndoRedoNewCommand1StateListDiagram.pptx
+++ b/docs/diagrams/UndoRedoNewCommand1StateListDiagram.pptx
@@ -112,10 +112,6 @@
 </p:presentation>
 </file>
 
-<file path=ppt/revisionInfo.xml><?xml version="1.0" encoding="utf-8"?>
-<p1510:revInfo xmlns:a="http://schemas.openxmlformats.org/drawingml/2006/main" xmlns:r="http://schemas.openxmlformats.org/officeDocument/2006/relationships" xmlns:p1510="http://schemas.microsoft.com/office/powerpoint/2015/10/main"/>
-</file>
-
 <file path=ppt/slideLayouts/slideLayout1.xml><?xml version="1.0" encoding="utf-8"?>
 <p:sldLayout xmlns:a="http://schemas.openxmlformats.org/drawingml/2006/main" xmlns:r="http://schemas.openxmlformats.org/officeDocument/2006/relationships" xmlns:p="http://schemas.openxmlformats.org/presentationml/2006/main" type="title" preserve="1">
   <p:cSld name="Title Slide">
@@ -265,7 +261,7 @@
           <a:p>
             <a:fld id="{03EC4E3E-8101-482F-A883-8B55DAFF7C07}" type="datetimeFigureOut">
               <a:rPr lang="en-SG" smtClean="0"/>
-              <a:t>6/7/2018</a:t>
+              <a:t>25/10/2018</a:t>
             </a:fld>
             <a:endParaRPr lang="en-SG"/>
           </a:p>
@@ -465,7 +461,7 @@
           <a:p>
             <a:fld id="{03EC4E3E-8101-482F-A883-8B55DAFF7C07}" type="datetimeFigureOut">
               <a:rPr lang="en-SG" smtClean="0"/>
-              <a:t>6/7/2018</a:t>
+              <a:t>25/10/2018</a:t>
             </a:fld>
             <a:endParaRPr lang="en-SG"/>
           </a:p>
@@ -675,7 +671,7 @@
           <a:p>
             <a:fld id="{03EC4E3E-8101-482F-A883-8B55DAFF7C07}" type="datetimeFigureOut">
               <a:rPr lang="en-SG" smtClean="0"/>
-              <a:t>6/7/2018</a:t>
+              <a:t>25/10/2018</a:t>
             </a:fld>
             <a:endParaRPr lang="en-SG"/>
           </a:p>
@@ -875,7 +871,7 @@
           <a:p>
             <a:fld id="{03EC4E3E-8101-482F-A883-8B55DAFF7C07}" type="datetimeFigureOut">
               <a:rPr lang="en-SG" smtClean="0"/>
-              <a:t>6/7/2018</a:t>
+              <a:t>25/10/2018</a:t>
             </a:fld>
             <a:endParaRPr lang="en-SG"/>
           </a:p>
@@ -1151,7 +1147,7 @@
           <a:p>
             <a:fld id="{03EC4E3E-8101-482F-A883-8B55DAFF7C07}" type="datetimeFigureOut">
               <a:rPr lang="en-SG" smtClean="0"/>
-              <a:t>6/7/2018</a:t>
+              <a:t>25/10/2018</a:t>
             </a:fld>
             <a:endParaRPr lang="en-SG"/>
           </a:p>
@@ -1419,7 +1415,7 @@
           <a:p>
             <a:fld id="{03EC4E3E-8101-482F-A883-8B55DAFF7C07}" type="datetimeFigureOut">
               <a:rPr lang="en-SG" smtClean="0"/>
-              <a:t>6/7/2018</a:t>
+              <a:t>25/10/2018</a:t>
             </a:fld>
             <a:endParaRPr lang="en-SG"/>
           </a:p>
@@ -1834,7 +1830,7 @@
           <a:p>
             <a:fld id="{03EC4E3E-8101-482F-A883-8B55DAFF7C07}" type="datetimeFigureOut">
               <a:rPr lang="en-SG" smtClean="0"/>
-              <a:t>6/7/2018</a:t>
+              <a:t>25/10/2018</a:t>
             </a:fld>
             <a:endParaRPr lang="en-SG"/>
           </a:p>
@@ -1976,7 +1972,7 @@
           <a:p>
             <a:fld id="{03EC4E3E-8101-482F-A883-8B55DAFF7C07}" type="datetimeFigureOut">
               <a:rPr lang="en-SG" smtClean="0"/>
-              <a:t>6/7/2018</a:t>
+              <a:t>25/10/2018</a:t>
             </a:fld>
             <a:endParaRPr lang="en-SG"/>
           </a:p>
@@ -2089,7 +2085,7 @@
           <a:p>
             <a:fld id="{03EC4E3E-8101-482F-A883-8B55DAFF7C07}" type="datetimeFigureOut">
               <a:rPr lang="en-SG" smtClean="0"/>
-              <a:t>6/7/2018</a:t>
+              <a:t>25/10/2018</a:t>
             </a:fld>
             <a:endParaRPr lang="en-SG"/>
           </a:p>
@@ -2402,7 +2398,7 @@
           <a:p>
             <a:fld id="{03EC4E3E-8101-482F-A883-8B55DAFF7C07}" type="datetimeFigureOut">
               <a:rPr lang="en-SG" smtClean="0"/>
-              <a:t>6/7/2018</a:t>
+              <a:t>25/10/2018</a:t>
             </a:fld>
             <a:endParaRPr lang="en-SG"/>
           </a:p>
@@ -2691,7 +2687,7 @@
           <a:p>
             <a:fld id="{03EC4E3E-8101-482F-A883-8B55DAFF7C07}" type="datetimeFigureOut">
               <a:rPr lang="en-SG" smtClean="0"/>
-              <a:t>6/7/2018</a:t>
+              <a:t>25/10/2018</a:t>
             </a:fld>
             <a:endParaRPr lang="en-SG"/>
           </a:p>
@@ -2934,7 +2930,7 @@
           <a:p>
             <a:fld id="{03EC4E3E-8101-482F-A883-8B55DAFF7C07}" type="datetimeFigureOut">
               <a:rPr lang="en-SG" smtClean="0"/>
-              <a:t>6/7/2018</a:t>
+              <a:t>25/10/2018</a:t>
             </a:fld>
             <a:endParaRPr lang="en-SG"/>
           </a:p>
@@ -3410,7 +3406,7 @@
           <p:nvPr>
             <p:extLst>
               <p:ext uri="{D42A27DB-BD31-4B8C-83A1-F6EECF244321}">
-                <p14:modId xmlns:p14="http://schemas.microsoft.com/office/powerpoint/2010/main" val="770650361"/>
+                <p14:modId xmlns:p14="http://schemas.microsoft.com/office/powerpoint/2010/main" val="503495066"/>
               </p:ext>
             </p:extLst>
           </p:nvPr>
@@ -3442,11 +3438,11 @@
                     <a:p>
                       <a:r>
                         <a:rPr lang="en-SG" u="sng" dirty="0"/>
-                        <a:t>ab0:</a:t>
+                        <a:t>schd0:</a:t>
                       </a:r>
                       <a:r>
                         <a:rPr lang="en-SG" sz="1800" u="sng" dirty="0"/>
-                        <a:t>AddressBook</a:t>
+                        <a:t>Scheduler</a:t>
                       </a:r>
                       <a:endParaRPr lang="en-SG" sz="1600" u="sng" dirty="0"/>
                     </a:p>
@@ -3658,7 +3654,7 @@
           <p:nvPr>
             <p:extLst>
               <p:ext uri="{D42A27DB-BD31-4B8C-83A1-F6EECF244321}">
-                <p14:modId xmlns:p14="http://schemas.microsoft.com/office/powerpoint/2010/main" val="2370624015"/>
+                <p14:modId xmlns:p14="http://schemas.microsoft.com/office/powerpoint/2010/main" val="2830632645"/>
               </p:ext>
             </p:extLst>
           </p:nvPr>
@@ -3690,11 +3686,11 @@
                     <a:p>
                       <a:r>
                         <a:rPr lang="en-SG" u="sng" dirty="0"/>
-                        <a:t>ab1:</a:t>
+                        <a:t>schd1:</a:t>
                       </a:r>
                       <a:r>
                         <a:rPr lang="en-SG" sz="1800" u="sng" dirty="0"/>
-                        <a:t>AddressBook</a:t>
+                        <a:t>Scheduler</a:t>
                       </a:r>
                       <a:endParaRPr lang="en-SG" sz="1600" u="sng" dirty="0"/>
                     </a:p>
@@ -3726,7 +3722,7 @@
           <p:nvPr>
             <p:extLst>
               <p:ext uri="{D42A27DB-BD31-4B8C-83A1-F6EECF244321}">
-                <p14:modId xmlns:p14="http://schemas.microsoft.com/office/powerpoint/2010/main" val="2523374166"/>
+                <p14:modId xmlns:p14="http://schemas.microsoft.com/office/powerpoint/2010/main" val="4228069303"/>
               </p:ext>
             </p:extLst>
           </p:nvPr>
@@ -3758,11 +3754,11 @@
                     <a:p>
                       <a:r>
                         <a:rPr lang="en-SG" u="sng" dirty="0"/>
-                        <a:t>ab0:</a:t>
+                        <a:t>schd0:</a:t>
                       </a:r>
                       <a:r>
                         <a:rPr lang="en-SG" sz="1800" u="sng" dirty="0"/>
-                        <a:t>AddressBook</a:t>
+                        <a:t>Scheduler</a:t>
                       </a:r>
                       <a:endParaRPr lang="en-SG" sz="1600" u="sng" dirty="0"/>
                     </a:p>

</xml_diff>